<commit_message>
final project plus extra content
</commit_message>
<xml_diff>
--- a/2nd Semester/MathAnalysis_Day_050 Focus on Project Goals.pptx
+++ b/2nd Semester/MathAnalysis_Day_050 Focus on Project Goals.pptx
@@ -17,7 +17,7 @@
     <p:sldId id="326" r:id="rId8"/>
     <p:sldId id="327" r:id="rId9"/>
     <p:sldId id="328" r:id="rId10"/>
-    <p:sldId id="321" r:id="rId11"/>
+    <p:sldId id="329" r:id="rId11"/>
   </p:sldIdLst>
   <p:sldSz cx="12192000" cy="6858000"/>
   <p:notesSz cx="9296400" cy="7010400"/>
@@ -206,7 +206,7 @@
           <a:p>
             <a:fld id="{0090E0ED-51A2-4D0E-BDCF-E17571396CEC}" type="datetimeFigureOut">
               <a:rPr lang="en-US" smtClean="0"/>
-              <a:t>2/6/2018</a:t>
+              <a:t>2/5/2019</a:t>
             </a:fld>
             <a:endParaRPr lang="en-US"/>
           </a:p>
@@ -459,7 +459,7 @@
             <a:fld id="{87DE6118-2437-4B30-8E3C-4D2BE6020583}" type="datetimeFigureOut">
               <a:rPr lang="en-US" dirty="0"/>
               <a:pPr/>
-              <a:t>2/6/2018</a:t>
+              <a:t>2/5/2019</a:t>
             </a:fld>
             <a:endParaRPr lang="en-US" dirty="0"/>
           </a:p>
@@ -785,7 +785,7 @@
           <a:p>
             <a:fld id="{87DE6118-2437-4B30-8E3C-4D2BE6020583}" type="datetimeFigureOut">
               <a:rPr lang="en-US" dirty="0"/>
-              <a:t>2/6/2018</a:t>
+              <a:t>2/5/2019</a:t>
             </a:fld>
             <a:endParaRPr lang="en-US" dirty="0"/>
           </a:p>
@@ -960,7 +960,7 @@
           <a:p>
             <a:fld id="{87DE6118-2437-4B30-8E3C-4D2BE6020583}" type="datetimeFigureOut">
               <a:rPr lang="en-US" dirty="0"/>
-              <a:t>2/6/2018</a:t>
+              <a:t>2/5/2019</a:t>
             </a:fld>
             <a:endParaRPr lang="en-US" dirty="0"/>
           </a:p>
@@ -1125,7 +1125,7 @@
           <a:p>
             <a:fld id="{87DE6118-2437-4B30-8E3C-4D2BE6020583}" type="datetimeFigureOut">
               <a:rPr lang="en-US" dirty="0"/>
-              <a:t>2/6/2018</a:t>
+              <a:t>2/5/2019</a:t>
             </a:fld>
             <a:endParaRPr lang="en-US" dirty="0"/>
           </a:p>
@@ -1398,7 +1398,7 @@
             <a:fld id="{87DE6118-2437-4B30-8E3C-4D2BE6020583}" type="datetimeFigureOut">
               <a:rPr lang="en-US" dirty="0"/>
               <a:pPr/>
-              <a:t>2/6/2018</a:t>
+              <a:t>2/5/2019</a:t>
             </a:fld>
             <a:endParaRPr lang="en-US" dirty="0"/>
           </a:p>
@@ -1788,7 +1788,7 @@
           <a:p>
             <a:fld id="{87DE6118-2437-4B30-8E3C-4D2BE6020583}" type="datetimeFigureOut">
               <a:rPr lang="en-US" dirty="0"/>
-              <a:t>2/6/2018</a:t>
+              <a:t>2/5/2019</a:t>
             </a:fld>
             <a:endParaRPr lang="en-US" dirty="0"/>
           </a:p>
@@ -2260,7 +2260,7 @@
           <a:p>
             <a:fld id="{87DE6118-2437-4B30-8E3C-4D2BE6020583}" type="datetimeFigureOut">
               <a:rPr lang="en-US" dirty="0"/>
-              <a:t>2/6/2018</a:t>
+              <a:t>2/5/2019</a:t>
             </a:fld>
             <a:endParaRPr lang="en-US" dirty="0"/>
           </a:p>
@@ -2373,7 +2373,7 @@
           <a:p>
             <a:fld id="{87DE6118-2437-4B30-8E3C-4D2BE6020583}" type="datetimeFigureOut">
               <a:rPr lang="en-US" dirty="0"/>
-              <a:t>2/6/2018</a:t>
+              <a:t>2/5/2019</a:t>
             </a:fld>
             <a:endParaRPr lang="en-US" dirty="0"/>
           </a:p>
@@ -2463,7 +2463,7 @@
           <a:p>
             <a:fld id="{87DE6118-2437-4B30-8E3C-4D2BE6020583}" type="datetimeFigureOut">
               <a:rPr lang="en-US" dirty="0"/>
-              <a:t>2/6/2018</a:t>
+              <a:t>2/5/2019</a:t>
             </a:fld>
             <a:endParaRPr lang="en-US" dirty="0"/>
           </a:p>
@@ -2805,7 +2805,7 @@
             <a:fld id="{87DE6118-2437-4B30-8E3C-4D2BE6020583}" type="datetimeFigureOut">
               <a:rPr lang="en-US" dirty="0"/>
               <a:pPr/>
-              <a:t>2/6/2018</a:t>
+              <a:t>2/5/2019</a:t>
             </a:fld>
             <a:endParaRPr lang="en-US" dirty="0"/>
           </a:p>
@@ -3190,7 +3190,7 @@
             <a:fld id="{87DE6118-2437-4B30-8E3C-4D2BE6020583}" type="datetimeFigureOut">
               <a:rPr lang="en-US" dirty="0"/>
               <a:pPr/>
-              <a:t>2/6/2018</a:t>
+              <a:t>2/5/2019</a:t>
             </a:fld>
             <a:endParaRPr lang="en-US" dirty="0"/>
           </a:p>
@@ -3465,7 +3465,7 @@
             <a:fld id="{87DE6118-2437-4B30-8E3C-4D2BE6020583}" type="datetimeFigureOut">
               <a:rPr lang="en-US" dirty="0"/>
               <a:pPr/>
-              <a:t>2/6/2018</a:t>
+              <a:t>2/5/2019</a:t>
             </a:fld>
             <a:endParaRPr lang="en-US" dirty="0"/>
           </a:p>
@@ -4073,7 +4073,7 @@
           <a:p>
             <a:r>
               <a:rPr lang="en-US" dirty="0" smtClean="0"/>
-              <a:t>Major Project Ideas</a:t>
+              <a:t>Get Done Today</a:t>
             </a:r>
             <a:endParaRPr lang="en-US" dirty="0"/>
           </a:p>
@@ -4091,53 +4091,69 @@
         </p:nvSpPr>
         <p:spPr>
           <a:xfrm>
-            <a:off x="1371600" y="2285999"/>
-            <a:ext cx="9601200" cy="4234721"/>
+            <a:off x="1371600" y="1560286"/>
+            <a:ext cx="10820400" cy="5297714"/>
           </a:xfrm>
         </p:spPr>
         <p:txBody>
           <a:bodyPr>
-            <a:normAutofit/>
+            <a:noAutofit/>
           </a:bodyPr>
           <a:lstStyle/>
           <a:p>
             <a:r>
               <a:rPr lang="en-US" sz="3400" dirty="0" smtClean="0"/>
-              <a:t>Bryan High School</a:t>
+              <a:t>Add </a:t>
+            </a:r>
+            <a:r>
+              <a:rPr lang="en-US" sz="3400" dirty="0" smtClean="0">
+                <a:hlinkClick r:id="rId2"/>
+              </a:rPr>
+              <a:t>charles.cuddy@ops.org</a:t>
+            </a:r>
+            <a:r>
+              <a:rPr lang="en-US" sz="3400" dirty="0" smtClean="0"/>
+              <a:t> to your Trello Board</a:t>
+            </a:r>
+          </a:p>
+          <a:p>
+            <a:r>
+              <a:rPr lang="en-US" sz="3400" dirty="0" smtClean="0"/>
+              <a:t>Create a Daily Standup Team page AND have all individuals answer</a:t>
+            </a:r>
+          </a:p>
+          <a:p>
+            <a:r>
+              <a:rPr lang="en-US" sz="3400" dirty="0" smtClean="0"/>
+              <a:t>Create a document that clearly states each individual’s role within team</a:t>
+            </a:r>
+          </a:p>
+          <a:p>
+            <a:r>
+              <a:rPr lang="en-US" sz="3400" dirty="0" smtClean="0"/>
+              <a:t>Create a 10 Week Layout</a:t>
+            </a:r>
+          </a:p>
+          <a:p>
+            <a:r>
+              <a:rPr lang="en-US" sz="3400" dirty="0" smtClean="0"/>
+              <a:t>On Trello – create minimum columns of Backlog, In Progress, Needs Review, Ready to Go</a:t>
+            </a:r>
+          </a:p>
+          <a:p>
+            <a:pPr lvl="1"/>
+            <a:r>
+              <a:rPr lang="en-US" sz="3400" dirty="0" smtClean="0"/>
+              <a:t>Fill up your Backlog with prioritized ideas </a:t>
             </a:r>
             <a:endParaRPr lang="en-US" sz="3400" dirty="0"/>
-          </a:p>
-          <a:p>
-            <a:r>
-              <a:rPr lang="en-US" sz="3400" dirty="0" smtClean="0"/>
-              <a:t>Video Games</a:t>
-            </a:r>
-          </a:p>
-          <a:p>
-            <a:r>
-              <a:rPr lang="en-US" sz="3400" dirty="0" smtClean="0"/>
-              <a:t>Stadium</a:t>
-            </a:r>
-          </a:p>
-          <a:p>
-            <a:r>
-              <a:rPr lang="en-US" sz="3400" dirty="0" smtClean="0"/>
-              <a:t>Dream House</a:t>
-            </a:r>
-          </a:p>
-          <a:p>
-            <a:r>
-              <a:rPr lang="en-US" sz="3400" dirty="0" smtClean="0"/>
-              <a:t>Town</a:t>
-            </a:r>
-            <a:endParaRPr lang="en-US" sz="3200" dirty="0"/>
           </a:p>
         </p:txBody>
       </p:sp>
     </p:spTree>
     <p:extLst>
       <p:ext uri="{BB962C8B-B14F-4D97-AF65-F5344CB8AC3E}">
-        <p14:creationId xmlns:p14="http://schemas.microsoft.com/office/powerpoint/2010/main" val="2422041689"/>
+        <p14:creationId xmlns:p14="http://schemas.microsoft.com/office/powerpoint/2010/main" val="1121485953"/>
       </p:ext>
     </p:extLst>
   </p:cSld>
@@ -4220,12 +4236,43 @@
               <a:buNone/>
             </a:pPr>
             <a:r>
+              <a:rPr lang="en-US" sz="3200" i="1" dirty="0"/>
+              <a:t>-- Please go to </a:t>
+            </a:r>
+            <a:r>
+              <a:rPr lang="en-US" sz="3200" i="1" dirty="0">
+                <a:hlinkClick r:id="rId2"/>
+              </a:rPr>
+              <a:t>www.trello.com</a:t>
+            </a:r>
+            <a:r>
+              <a:rPr lang="en-US" sz="3200" i="1" dirty="0"/>
+              <a:t> and sign up for an account– </a:t>
+            </a:r>
+            <a:endParaRPr lang="en-US" sz="2400" i="1" dirty="0"/>
+          </a:p>
+          <a:p>
+            <a:pPr marL="0" indent="0">
+              <a:buNone/>
+            </a:pPr>
+            <a:r>
               <a:rPr lang="en-US" sz="3200" dirty="0" smtClean="0"/>
-              <a:t>Begin to Organize for Main </a:t>
-            </a:r>
+              <a:t>	(play around with the site as you feel fit)</a:t>
+            </a:r>
+          </a:p>
+          <a:p>
+            <a:pPr marL="0" indent="0">
+              <a:buNone/>
+            </a:pPr>
+            <a:endParaRPr lang="en-US" sz="3200" dirty="0"/>
+          </a:p>
+          <a:p>
+            <a:pPr marL="0" indent="0">
+              <a:buNone/>
+            </a:pPr>
             <a:r>
               <a:rPr lang="en-US" sz="3200" dirty="0" smtClean="0"/>
-              <a:t>Project</a:t>
+              <a:t>-- Begin to Organize for Main Project (as outlined on following slides)</a:t>
             </a:r>
             <a:endParaRPr lang="en-US" sz="3200" dirty="0"/>
           </a:p>
@@ -4234,24 +4281,6 @@
               <a:buNone/>
             </a:pPr>
             <a:endParaRPr lang="en-US" sz="3200" i="1" dirty="0"/>
-          </a:p>
-          <a:p>
-            <a:pPr marL="0" indent="0">
-              <a:buNone/>
-            </a:pPr>
-            <a:r>
-              <a:rPr lang="en-US" sz="3200" i="1" dirty="0" smtClean="0"/>
-              <a:t>Sign up </a:t>
-            </a:r>
-            <a:r>
-              <a:rPr lang="en-US" sz="3200" i="1" dirty="0"/>
-              <a:t>for Trello </a:t>
-            </a:r>
-            <a:r>
-              <a:rPr lang="en-US" sz="3200" i="1" dirty="0" smtClean="0"/>
-              <a:t>– www.trello.com</a:t>
-            </a:r>
-            <a:endParaRPr lang="en-US" sz="2400" i="1" dirty="0" smtClean="0"/>
           </a:p>
         </p:txBody>
       </p:sp>
@@ -4314,7 +4343,11 @@
           <a:p>
             <a:r>
               <a:rPr lang="en-US" dirty="0" smtClean="0"/>
-              <a:t>Major Project Groups</a:t>
+              <a:t>Major Project </a:t>
+            </a:r>
+            <a:r>
+              <a:rPr lang="en-US" dirty="0" smtClean="0"/>
+              <a:t>Groups</a:t>
             </a:r>
             <a:endParaRPr lang="en-US" dirty="0"/>
           </a:p>
@@ -4338,138 +4371,27 @@
         </p:spPr>
         <p:txBody>
           <a:bodyPr>
-            <a:normAutofit fontScale="92500" lnSpcReduction="20000"/>
+            <a:normAutofit/>
           </a:bodyPr>
           <a:lstStyle/>
           <a:p>
-            <a:pPr marL="0" indent="0">
-              <a:buNone/>
-            </a:pPr>
-            <a:r>
-              <a:rPr lang="en-US" sz="3400" dirty="0" smtClean="0"/>
-              <a:t>Bryan High </a:t>
-            </a:r>
-            <a:r>
-              <a:rPr lang="en-US" sz="3400" dirty="0" smtClean="0"/>
-              <a:t>School:</a:t>
-            </a:r>
-            <a:endParaRPr lang="en-US" sz="3400" dirty="0" smtClean="0"/>
-          </a:p>
-          <a:p>
-            <a:pPr marL="530352" lvl="1" indent="0">
-              <a:buNone/>
-            </a:pPr>
-            <a:r>
-              <a:rPr lang="en-US" sz="3400" dirty="0" smtClean="0"/>
-              <a:t>Emily, </a:t>
-            </a:r>
-            <a:r>
-              <a:rPr lang="en-US" sz="3400" dirty="0" smtClean="0"/>
-              <a:t>Nicole, </a:t>
-            </a:r>
-            <a:r>
-              <a:rPr lang="en-US" sz="3400" dirty="0" err="1" smtClean="0"/>
-              <a:t>Patrik</a:t>
-            </a:r>
-            <a:r>
-              <a:rPr lang="en-US" sz="3400" dirty="0" smtClean="0"/>
-              <a:t>, </a:t>
-            </a:r>
-            <a:r>
-              <a:rPr lang="en-US" sz="3400" dirty="0" smtClean="0"/>
-              <a:t>Adriana, Fernando</a:t>
-            </a:r>
-            <a:endParaRPr lang="en-US" sz="3400" dirty="0" smtClean="0"/>
-          </a:p>
-          <a:p>
-            <a:pPr marL="0" indent="0">
-              <a:buNone/>
-            </a:pPr>
-            <a:r>
-              <a:rPr lang="en-US" sz="3400" dirty="0" smtClean="0"/>
-              <a:t/>
-            </a:r>
-            <a:br>
-              <a:rPr lang="en-US" sz="3400" dirty="0" smtClean="0"/>
-            </a:br>
-            <a:r>
-              <a:rPr lang="en-US" sz="3400" dirty="0" smtClean="0"/>
-              <a:t>Town:</a:t>
-            </a:r>
-            <a:endParaRPr lang="en-US" sz="3400" dirty="0" smtClean="0"/>
-          </a:p>
-          <a:p>
-            <a:pPr marL="530352" lvl="1" indent="0">
-              <a:buNone/>
-            </a:pPr>
-            <a:r>
-              <a:rPr lang="en-US" sz="3400" dirty="0" err="1" smtClean="0"/>
-              <a:t>Jakob</a:t>
-            </a:r>
-            <a:r>
-              <a:rPr lang="en-US" sz="3400" dirty="0" smtClean="0"/>
-              <a:t>, Alyssa, </a:t>
-            </a:r>
-            <a:r>
-              <a:rPr lang="en-US" sz="3400" dirty="0" smtClean="0"/>
-              <a:t>Pieter</a:t>
-            </a:r>
-          </a:p>
-          <a:p>
             <a:pPr marL="530352" lvl="1" indent="0">
               <a:buNone/>
             </a:pPr>
             <a:endParaRPr lang="en-US" sz="3400" dirty="0" smtClean="0"/>
           </a:p>
           <a:p>
-            <a:pPr marL="0" indent="0">
+            <a:pPr marL="530352" lvl="1" indent="0">
               <a:buNone/>
             </a:pPr>
             <a:r>
+              <a:rPr lang="en-US" sz="3400" dirty="0" err="1" smtClean="0"/>
+              <a:t>Fortnite</a:t>
+            </a:r>
+            <a:r>
               <a:rPr lang="en-US" sz="3400" dirty="0" smtClean="0"/>
-              <a:t>Pagoda Village: </a:t>
-            </a:r>
-            <a:endParaRPr lang="en-US" sz="3400" dirty="0" smtClean="0"/>
-          </a:p>
-          <a:p>
-            <a:pPr lvl="1"/>
-            <a:r>
-              <a:rPr lang="en-US" sz="3400" dirty="0" smtClean="0"/>
-              <a:t>Stephen, Gerardo, Noah</a:t>
-            </a:r>
-            <a:endParaRPr lang="en-US" sz="3400" dirty="0"/>
-          </a:p>
-          <a:p>
-            <a:pPr marL="530352" lvl="1" indent="0">
-              <a:buNone/>
-            </a:pPr>
-            <a:endParaRPr lang="en-US" sz="3400" dirty="0" smtClean="0"/>
-          </a:p>
-          <a:p>
-            <a:pPr marL="0" indent="0">
-              <a:buNone/>
-            </a:pPr>
-            <a:r>
-              <a:rPr lang="en-US" sz="3400" dirty="0" smtClean="0"/>
-              <a:t>Fort </a:t>
-            </a:r>
-            <a:r>
-              <a:rPr lang="en-US" sz="3400" dirty="0" err="1" smtClean="0"/>
-              <a:t>Nite</a:t>
-            </a:r>
-            <a:r>
-              <a:rPr lang="en-US" sz="3400" dirty="0" smtClean="0"/>
-              <a:t>: </a:t>
-            </a:r>
-            <a:endParaRPr lang="en-US" sz="3400" dirty="0"/>
-          </a:p>
-          <a:p>
-            <a:pPr lvl="1"/>
-            <a:r>
-              <a:rPr lang="en-US" sz="3400" dirty="0" smtClean="0"/>
-              <a:t>Dylan, Sam, Faith</a:t>
-            </a:r>
-            <a:endParaRPr lang="en-US" sz="3400" dirty="0"/>
+              <a:t> (2 groups)</a:t>
+            </a:r>
           </a:p>
           <a:p>
             <a:pPr marL="530352" lvl="1" indent="0">
@@ -4481,115 +4403,378 @@
             <a:pPr marL="530352" lvl="1" indent="0">
               <a:buNone/>
             </a:pPr>
+            <a:r>
+              <a:rPr lang="en-US" sz="3400" dirty="0" smtClean="0"/>
+              <a:t>Sorry</a:t>
+            </a:r>
+          </a:p>
+          <a:p>
+            <a:pPr marL="530352" lvl="1" indent="0">
+              <a:buNone/>
+            </a:pPr>
+            <a:endParaRPr lang="en-US" sz="3400" dirty="0"/>
+          </a:p>
+          <a:p>
+            <a:pPr marL="530352" lvl="1" indent="0">
+              <a:buNone/>
+            </a:pPr>
+            <a:r>
+              <a:rPr lang="en-US" sz="3400" dirty="0" smtClean="0"/>
+              <a:t>Memorial Park</a:t>
+            </a:r>
+            <a:endParaRPr lang="en-US" sz="3400" dirty="0"/>
+          </a:p>
+          <a:p>
+            <a:pPr marL="530352" lvl="1" indent="0">
+              <a:buNone/>
+            </a:pPr>
             <a:endParaRPr lang="en-US" dirty="0" smtClean="0"/>
           </a:p>
         </p:txBody>
       </p:sp>
       <p:sp>
         <p:nvSpPr>
-          <p:cNvPr id="4" name="Rectangle 3"/>
-          <p:cNvSpPr/>
+          <p:cNvPr id="5" name="Content Placeholder 2"/>
+          <p:cNvSpPr txBox="1">
+            <a:spLocks/>
+          </p:cNvSpPr>
           <p:nvPr/>
         </p:nvSpPr>
         <p:spPr>
           <a:xfrm>
-            <a:off x="6323463" y="896487"/>
-            <a:ext cx="5868537" cy="5847755"/>
+            <a:off x="6011057" y="896487"/>
+            <a:ext cx="5873870" cy="5336274"/>
           </a:xfrm>
           <a:prstGeom prst="rect">
             <a:avLst/>
           </a:prstGeom>
         </p:spPr>
         <p:txBody>
-          <a:bodyPr wrap="square">
-            <a:spAutoFit/>
+          <a:bodyPr vert="horz" lIns="91440" tIns="45720" rIns="91440" bIns="45720" rtlCol="0">
+            <a:normAutofit lnSpcReduction="10000"/>
           </a:bodyPr>
-          <a:lstStyle/>
-          <a:p>
+          <a:lstStyle>
+            <a:lvl1pPr marL="384048" indent="-384048" algn="l" defTabSz="914400" rtl="0" eaLnBrk="1" latinLnBrk="0" hangingPunct="1">
+              <a:lnSpc>
+                <a:spcPct val="94000"/>
+              </a:lnSpc>
+              <a:spcBef>
+                <a:spcPts val="1000"/>
+              </a:spcBef>
+              <a:spcAft>
+                <a:spcPts val="200"/>
+              </a:spcAft>
+              <a:buFont typeface="Franklin Gothic Book" panose="020B0503020102020204" pitchFamily="34" charset="0"/>
+              <a:buChar char="■"/>
+              <a:defRPr sz="2000" kern="1200" baseline="0">
+                <a:solidFill>
+                  <a:schemeClr val="tx2"/>
+                </a:solidFill>
+                <a:latin typeface="+mn-lt"/>
+                <a:ea typeface="+mn-ea"/>
+                <a:cs typeface="+mn-cs"/>
+              </a:defRPr>
+            </a:lvl1pPr>
+            <a:lvl2pPr marL="914400" indent="-384048" algn="l" defTabSz="914400" rtl="0" eaLnBrk="1" latinLnBrk="0" hangingPunct="1">
+              <a:lnSpc>
+                <a:spcPct val="94000"/>
+              </a:lnSpc>
+              <a:spcBef>
+                <a:spcPts val="500"/>
+              </a:spcBef>
+              <a:spcAft>
+                <a:spcPts val="200"/>
+              </a:spcAft>
+              <a:buFont typeface="Franklin Gothic Book" panose="020B0503020102020204" pitchFamily="34" charset="0"/>
+              <a:buChar char="–"/>
+              <a:defRPr sz="2000" i="1" kern="1200" baseline="0">
+                <a:solidFill>
+                  <a:schemeClr val="tx2"/>
+                </a:solidFill>
+                <a:latin typeface="+mn-lt"/>
+                <a:ea typeface="+mn-ea"/>
+                <a:cs typeface="+mn-cs"/>
+              </a:defRPr>
+            </a:lvl2pPr>
+            <a:lvl3pPr marL="1371600" indent="-384048" algn="l" defTabSz="914400" rtl="0" eaLnBrk="1" latinLnBrk="0" hangingPunct="1">
+              <a:lnSpc>
+                <a:spcPct val="94000"/>
+              </a:lnSpc>
+              <a:spcBef>
+                <a:spcPts val="500"/>
+              </a:spcBef>
+              <a:spcAft>
+                <a:spcPts val="200"/>
+              </a:spcAft>
+              <a:buFont typeface="Franklin Gothic Book" panose="020B0503020102020204" pitchFamily="34" charset="0"/>
+              <a:buChar char="■"/>
+              <a:defRPr sz="1800" kern="1200" baseline="0">
+                <a:solidFill>
+                  <a:schemeClr val="tx2"/>
+                </a:solidFill>
+                <a:latin typeface="+mn-lt"/>
+                <a:ea typeface="+mn-ea"/>
+                <a:cs typeface="+mn-cs"/>
+              </a:defRPr>
+            </a:lvl3pPr>
+            <a:lvl4pPr marL="1828800" indent="-384048" algn="l" defTabSz="914400" rtl="0" eaLnBrk="1" latinLnBrk="0" hangingPunct="1">
+              <a:lnSpc>
+                <a:spcPct val="94000"/>
+              </a:lnSpc>
+              <a:spcBef>
+                <a:spcPts val="500"/>
+              </a:spcBef>
+              <a:spcAft>
+                <a:spcPts val="200"/>
+              </a:spcAft>
+              <a:buFont typeface="Franklin Gothic Book" panose="020B0503020102020204" pitchFamily="34" charset="0"/>
+              <a:buChar char="–"/>
+              <a:defRPr sz="1800" i="1" kern="1200" baseline="0">
+                <a:solidFill>
+                  <a:schemeClr val="tx2"/>
+                </a:solidFill>
+                <a:latin typeface="+mn-lt"/>
+                <a:ea typeface="+mn-ea"/>
+                <a:cs typeface="+mn-cs"/>
+              </a:defRPr>
+            </a:lvl4pPr>
+            <a:lvl5pPr marL="2286000" indent="-384048" algn="l" defTabSz="914400" rtl="0" eaLnBrk="1" latinLnBrk="0" hangingPunct="1">
+              <a:lnSpc>
+                <a:spcPct val="94000"/>
+              </a:lnSpc>
+              <a:spcBef>
+                <a:spcPts val="500"/>
+              </a:spcBef>
+              <a:spcAft>
+                <a:spcPts val="200"/>
+              </a:spcAft>
+              <a:buFont typeface="Franklin Gothic Book" panose="020B0503020102020204" pitchFamily="34" charset="0"/>
+              <a:buChar char="■"/>
+              <a:defRPr sz="1600" kern="1200" baseline="0">
+                <a:solidFill>
+                  <a:schemeClr val="tx2"/>
+                </a:solidFill>
+                <a:latin typeface="+mn-lt"/>
+                <a:ea typeface="+mn-ea"/>
+                <a:cs typeface="+mn-cs"/>
+              </a:defRPr>
+            </a:lvl5pPr>
+            <a:lvl6pPr marL="2743200" indent="-384048" algn="l" defTabSz="914400" rtl="0" eaLnBrk="1" latinLnBrk="0" hangingPunct="1">
+              <a:lnSpc>
+                <a:spcPct val="94000"/>
+              </a:lnSpc>
+              <a:spcBef>
+                <a:spcPts val="500"/>
+              </a:spcBef>
+              <a:spcAft>
+                <a:spcPts val="200"/>
+              </a:spcAft>
+              <a:buFont typeface="Franklin Gothic Book" panose="020B0503020102020204" pitchFamily="34" charset="0"/>
+              <a:buChar char="–"/>
+              <a:defRPr sz="1600" i="1" kern="1200" baseline="0">
+                <a:solidFill>
+                  <a:schemeClr val="tx2"/>
+                </a:solidFill>
+                <a:latin typeface="+mn-lt"/>
+                <a:ea typeface="+mn-ea"/>
+                <a:cs typeface="+mn-cs"/>
+              </a:defRPr>
+            </a:lvl6pPr>
+            <a:lvl7pPr marL="3200400" indent="-384048" algn="l" defTabSz="914400" rtl="0" eaLnBrk="1" latinLnBrk="0" hangingPunct="1">
+              <a:lnSpc>
+                <a:spcPct val="94000"/>
+              </a:lnSpc>
+              <a:spcBef>
+                <a:spcPts val="500"/>
+              </a:spcBef>
+              <a:spcAft>
+                <a:spcPts val="200"/>
+              </a:spcAft>
+              <a:buFont typeface="Franklin Gothic Book" panose="020B0503020102020204" pitchFamily="34" charset="0"/>
+              <a:buChar char="■"/>
+              <a:defRPr sz="1400" kern="1200" baseline="0">
+                <a:solidFill>
+                  <a:schemeClr val="tx2"/>
+                </a:solidFill>
+                <a:latin typeface="+mn-lt"/>
+                <a:ea typeface="+mn-ea"/>
+                <a:cs typeface="+mn-cs"/>
+              </a:defRPr>
+            </a:lvl7pPr>
+            <a:lvl8pPr marL="3657600" indent="-384048" algn="l" defTabSz="914400" rtl="0" eaLnBrk="1" latinLnBrk="0" hangingPunct="1">
+              <a:lnSpc>
+                <a:spcPct val="94000"/>
+              </a:lnSpc>
+              <a:spcBef>
+                <a:spcPts val="500"/>
+              </a:spcBef>
+              <a:spcAft>
+                <a:spcPts val="200"/>
+              </a:spcAft>
+              <a:buFont typeface="Franklin Gothic Book" panose="020B0503020102020204" pitchFamily="34" charset="0"/>
+              <a:buChar char="–"/>
+              <a:defRPr sz="1400" i="1" kern="1200" baseline="0">
+                <a:solidFill>
+                  <a:schemeClr val="tx2"/>
+                </a:solidFill>
+                <a:latin typeface="+mn-lt"/>
+                <a:ea typeface="+mn-ea"/>
+                <a:cs typeface="+mn-cs"/>
+              </a:defRPr>
+            </a:lvl8pPr>
+            <a:lvl9pPr marL="4114800" indent="-384048" algn="l" defTabSz="914400" rtl="0" eaLnBrk="1" latinLnBrk="0" hangingPunct="1">
+              <a:lnSpc>
+                <a:spcPct val="94000"/>
+              </a:lnSpc>
+              <a:spcBef>
+                <a:spcPts val="500"/>
+              </a:spcBef>
+              <a:spcAft>
+                <a:spcPts val="200"/>
+              </a:spcAft>
+              <a:buFont typeface="Franklin Gothic Book" panose="020B0503020102020204" pitchFamily="34" charset="0"/>
+              <a:buChar char="■"/>
+              <a:defRPr sz="1400" kern="1200" baseline="0">
+                <a:solidFill>
+                  <a:schemeClr val="tx2"/>
+                </a:solidFill>
+                <a:latin typeface="+mn-lt"/>
+                <a:ea typeface="+mn-ea"/>
+                <a:cs typeface="+mn-cs"/>
+              </a:defRPr>
+            </a:lvl9pPr>
+          </a:lstStyle>
+          <a:p>
+            <a:pPr marL="530352" lvl="1" indent="0">
+              <a:buFont typeface="Franklin Gothic Book" panose="020B0503020102020204" pitchFamily="34" charset="0"/>
+              <a:buNone/>
+            </a:pPr>
+            <a:endParaRPr lang="en-US" sz="3400" dirty="0" smtClean="0"/>
+          </a:p>
+          <a:p>
+            <a:pPr marL="530352" lvl="1" indent="0">
+              <a:buFont typeface="Franklin Gothic Book" panose="020B0503020102020204" pitchFamily="34" charset="0"/>
+              <a:buNone/>
+            </a:pPr>
             <a:r>
               <a:rPr lang="en-US" sz="3400" dirty="0" smtClean="0"/>
-              <a:t>Zoo:</a:t>
-            </a:r>
+              <a:t>Mario Bros</a:t>
+            </a:r>
+          </a:p>
+          <a:p>
+            <a:pPr marL="530352" lvl="1" indent="0">
+              <a:buFont typeface="Franklin Gothic Book" panose="020B0503020102020204" pitchFamily="34" charset="0"/>
+              <a:buNone/>
+            </a:pPr>
+            <a:endParaRPr lang="en-US" sz="3400" dirty="0" smtClean="0"/>
+          </a:p>
+          <a:p>
+            <a:pPr marL="530352" lvl="1" indent="0">
+              <a:buFont typeface="Franklin Gothic Book" panose="020B0503020102020204" pitchFamily="34" charset="0"/>
+              <a:buNone/>
+            </a:pPr>
+            <a:r>
+              <a:rPr lang="en-US" sz="3400" dirty="0" err="1" smtClean="0"/>
+              <a:t>Krusty</a:t>
+            </a:r>
+            <a:r>
+              <a:rPr lang="en-US" sz="3400" dirty="0" smtClean="0"/>
+              <a:t> </a:t>
+            </a:r>
+            <a:r>
+              <a:rPr lang="en-US" sz="3400" dirty="0" err="1" smtClean="0"/>
+              <a:t>Krab</a:t>
+            </a:r>
+            <a:endParaRPr lang="en-US" sz="3400" dirty="0" smtClean="0"/>
+          </a:p>
+          <a:p>
+            <a:pPr marL="530352" lvl="1" indent="0">
+              <a:buFont typeface="Franklin Gothic Book" panose="020B0503020102020204" pitchFamily="34" charset="0"/>
+              <a:buNone/>
+            </a:pPr>
             <a:endParaRPr lang="en-US" sz="3400" dirty="0"/>
           </a:p>
           <a:p>
-            <a:pPr lvl="1"/>
-            <a:r>
-              <a:rPr lang="en-US" sz="3400" dirty="0"/>
-              <a:t>Edwin, Crystal, </a:t>
-            </a:r>
-            <a:r>
-              <a:rPr lang="en-US" sz="3400" dirty="0" err="1"/>
-              <a:t>Yamile</a:t>
-            </a:r>
-            <a:r>
-              <a:rPr lang="en-US" sz="3400" dirty="0"/>
-              <a:t>, Francisco</a:t>
-            </a:r>
-          </a:p>
-          <a:p>
+            <a:pPr marL="530352" lvl="1" indent="0">
+              <a:buFont typeface="Franklin Gothic Book" panose="020B0503020102020204" pitchFamily="34" charset="0"/>
+              <a:buNone/>
+            </a:pPr>
+            <a:r>
+              <a:rPr lang="en-US" sz="3400" dirty="0" smtClean="0"/>
+              <a:t>Library </a:t>
+            </a:r>
+          </a:p>
+          <a:p>
+            <a:pPr marL="530352" lvl="1" indent="0">
+              <a:buFont typeface="Franklin Gothic Book" panose="020B0503020102020204" pitchFamily="34" charset="0"/>
+              <a:buNone/>
+            </a:pPr>
+            <a:endParaRPr lang="en-US" sz="3400" dirty="0">
+              <a:sym typeface="Wingdings" panose="05000000000000000000" pitchFamily="2" charset="2"/>
+            </a:endParaRPr>
+          </a:p>
+          <a:p>
+            <a:pPr marL="530352" lvl="1" indent="0">
+              <a:buFont typeface="Franklin Gothic Book" panose="020B0503020102020204" pitchFamily="34" charset="0"/>
+              <a:buNone/>
+            </a:pPr>
+            <a:r>
+              <a:rPr lang="en-US" sz="3400" dirty="0" smtClean="0">
+                <a:sym typeface="Wingdings" panose="05000000000000000000" pitchFamily="2" charset="2"/>
+              </a:rPr>
+              <a:t>Need Project Plan  </a:t>
+            </a:r>
+            <a:r>
+              <a:rPr lang="en-US" sz="3400" dirty="0" err="1" smtClean="0">
+                <a:sym typeface="Wingdings" panose="05000000000000000000" pitchFamily="2" charset="2"/>
+              </a:rPr>
+              <a:t>J’Lyssa</a:t>
+            </a:r>
+            <a:r>
+              <a:rPr lang="en-US" sz="3400" dirty="0" smtClean="0">
+                <a:sym typeface="Wingdings" panose="05000000000000000000" pitchFamily="2" charset="2"/>
+              </a:rPr>
+              <a:t>, Jose, </a:t>
+            </a:r>
+            <a:r>
+              <a:rPr lang="en-US" sz="3400" dirty="0" err="1" smtClean="0">
+                <a:sym typeface="Wingdings" panose="05000000000000000000" pitchFamily="2" charset="2"/>
+              </a:rPr>
+              <a:t>Jazsile</a:t>
+            </a:r>
+            <a:r>
+              <a:rPr lang="en-US" sz="3400" dirty="0" smtClean="0">
+                <a:sym typeface="Wingdings" panose="05000000000000000000" pitchFamily="2" charset="2"/>
+              </a:rPr>
+              <a:t>, </a:t>
+            </a:r>
+            <a:r>
+              <a:rPr lang="en-US" sz="3400" dirty="0" err="1" smtClean="0">
+                <a:sym typeface="Wingdings" panose="05000000000000000000" pitchFamily="2" charset="2"/>
+              </a:rPr>
+              <a:t>Zakina</a:t>
+            </a:r>
+            <a:r>
+              <a:rPr lang="en-US" sz="3400" dirty="0" smtClean="0">
+                <a:sym typeface="Wingdings" panose="05000000000000000000" pitchFamily="2" charset="2"/>
+              </a:rPr>
+              <a:t> </a:t>
+            </a:r>
             <a:endParaRPr lang="en-US" sz="3400" dirty="0" smtClean="0"/>
           </a:p>
           <a:p>
-            <a:r>
-              <a:rPr lang="en-US" sz="3400" dirty="0" smtClean="0"/>
-              <a:t>Castle </a:t>
-            </a:r>
-            <a:r>
-              <a:rPr lang="en-US" sz="3400" dirty="0"/>
-              <a:t>from Fire Emblem </a:t>
-            </a:r>
-            <a:r>
-              <a:rPr lang="en-US" sz="3400" dirty="0" err="1"/>
-              <a:t>Heros</a:t>
-            </a:r>
-            <a:endParaRPr lang="en-US" sz="3400" dirty="0"/>
-          </a:p>
-          <a:p>
-            <a:pPr lvl="1"/>
-            <a:r>
-              <a:rPr lang="en-US" sz="3400" dirty="0"/>
-              <a:t>Pedro, Truman, Michael</a:t>
-            </a:r>
-          </a:p>
-          <a:p>
+            <a:pPr marL="530352" lvl="1" indent="0">
+              <a:buFont typeface="Franklin Gothic Book" panose="020B0503020102020204" pitchFamily="34" charset="0"/>
+              <a:buNone/>
+            </a:pPr>
             <a:endParaRPr lang="en-US" sz="3400" dirty="0" smtClean="0"/>
           </a:p>
           <a:p>
-            <a:r>
-              <a:rPr lang="en-US" sz="3400" dirty="0" smtClean="0"/>
-              <a:t>Dragon Ball - Moises</a:t>
-            </a:r>
-          </a:p>
-          <a:p>
-            <a:endParaRPr lang="en-US" sz="3400" dirty="0" smtClean="0"/>
-          </a:p>
-          <a:p>
-            <a:r>
-              <a:rPr lang="en-US" sz="3400" dirty="0" smtClean="0"/>
-              <a:t>Fort </a:t>
-            </a:r>
-            <a:r>
-              <a:rPr lang="en-US" sz="3400" dirty="0" err="1" smtClean="0"/>
-              <a:t>Nite</a:t>
-            </a:r>
-            <a:r>
-              <a:rPr lang="en-US" sz="3400" smtClean="0"/>
-              <a:t>`:</a:t>
-            </a:r>
-            <a:endParaRPr lang="en-US" sz="3400" dirty="0"/>
-          </a:p>
-          <a:p>
-            <a:pPr lvl="1"/>
-            <a:r>
-              <a:rPr lang="en-US" sz="3400" dirty="0"/>
-              <a:t>Jesse, Cole, Austin, </a:t>
-            </a:r>
-            <a:r>
-              <a:rPr lang="en-US" sz="3400" dirty="0" err="1"/>
-              <a:t>Kemari</a:t>
-            </a:r>
-            <a:endParaRPr lang="en-US" sz="3400" dirty="0"/>
+            <a:pPr marL="530352" lvl="1" indent="0">
+              <a:buFont typeface="Franklin Gothic Book" panose="020B0503020102020204" pitchFamily="34" charset="0"/>
+              <a:buNone/>
+            </a:pPr>
+            <a:endParaRPr lang="en-US" dirty="0" smtClean="0"/>
           </a:p>
         </p:txBody>
       </p:sp>
@@ -4683,14 +4868,26 @@
           <a:p>
             <a:r>
               <a:rPr lang="en-US" sz="3400" dirty="0" smtClean="0"/>
-              <a:t>Paper/pencil sketch of project… emphasis on scale… for real items we need to discuss amongst groups the scale that we will be using</a:t>
+              <a:t>Paper/pencil sketch of project… emphasis on </a:t>
+            </a:r>
+            <a:r>
+              <a:rPr lang="en-US" sz="3400" b="1" u="sng" dirty="0" smtClean="0"/>
+              <a:t>scale</a:t>
+            </a:r>
+            <a:r>
+              <a:rPr lang="en-US" sz="3400" dirty="0" smtClean="0"/>
+              <a:t>… for real items we need to discuss amongst groups the scale that we will be using</a:t>
             </a:r>
           </a:p>
           <a:p>
             <a:pPr lvl="1"/>
             <a:r>
               <a:rPr lang="en-US" sz="3400" dirty="0" smtClean="0"/>
-              <a:t>Ideally building something that has measurements</a:t>
+              <a:t>Ideally building something that has measurements </a:t>
+            </a:r>
+            <a:r>
+              <a:rPr lang="en-US" sz="3400" b="1" dirty="0" smtClean="0"/>
+              <a:t>(1 block typically = 3 feet)</a:t>
             </a:r>
           </a:p>
           <a:p>
@@ -4873,7 +5070,7 @@
           <a:p>
             <a:r>
               <a:rPr lang="en-US" sz="3400" dirty="0" smtClean="0"/>
-              <a:t>Week 1: </a:t>
+              <a:t>Week 1: Assign Roles, List important concepts that need to get coded… _________</a:t>
             </a:r>
           </a:p>
           <a:p>
@@ -4912,18 +5109,14 @@
             </a:pPr>
             <a:r>
               <a:rPr lang="en-US" sz="3400" b="1" dirty="0" smtClean="0"/>
-              <a:t>	</a:t>
-            </a:r>
-            <a:r>
-              <a:rPr lang="en-US" sz="3400" b="1" dirty="0" smtClean="0"/>
-              <a:t>.</a:t>
+              <a:t>	.</a:t>
             </a:r>
             <a:endParaRPr lang="en-US" sz="3400" dirty="0"/>
           </a:p>
           <a:p>
             <a:r>
               <a:rPr lang="en-US" sz="3400" dirty="0" smtClean="0"/>
-              <a:t>Week 10: Finalize Code, Begin to Put Presentation today </a:t>
+              <a:t>Week 10: Finalize Code, Begin to Put Presentation together </a:t>
             </a:r>
             <a:endParaRPr lang="en-US" sz="3400" dirty="0"/>
           </a:p>
@@ -4976,14 +5169,19 @@
             <p:ph type="title"/>
           </p:nvPr>
         </p:nvSpPr>
-        <p:spPr/>
+        <p:spPr>
+          <a:xfrm>
+            <a:off x="1049311" y="685800"/>
+            <a:ext cx="11142689" cy="1485900"/>
+          </a:xfrm>
+        </p:spPr>
         <p:txBody>
           <a:bodyPr/>
           <a:lstStyle/>
           <a:p>
             <a:r>
               <a:rPr lang="en-US" dirty="0" smtClean="0"/>
-              <a:t>Daily Reflection to Start</a:t>
+              <a:t>Daily Reflection to Start Per Person (not group)</a:t>
             </a:r>
             <a:endParaRPr lang="en-US" dirty="0"/>
           </a:p>
@@ -5001,7 +5199,7 @@
         </p:nvSpPr>
         <p:spPr>
           <a:xfrm>
-            <a:off x="1371600" y="1692322"/>
+            <a:off x="1049311" y="1647351"/>
             <a:ext cx="9601200" cy="4940490"/>
           </a:xfrm>
         </p:spPr>
@@ -5096,14 +5294,19 @@
             <p:ph type="title"/>
           </p:nvPr>
         </p:nvSpPr>
-        <p:spPr/>
+        <p:spPr>
+          <a:xfrm>
+            <a:off x="1079291" y="685800"/>
+            <a:ext cx="10717967" cy="1485900"/>
+          </a:xfrm>
+        </p:spPr>
         <p:txBody>
           <a:bodyPr/>
           <a:lstStyle/>
           <a:p>
             <a:r>
               <a:rPr lang="en-US" dirty="0" smtClean="0"/>
-              <a:t>Daily One on One’s With Mr. Cuddy</a:t>
+              <a:t>Daily/Weekly One on One’s With Mr. Cuddy</a:t>
             </a:r>
             <a:endParaRPr lang="en-US" dirty="0"/>
           </a:p>
@@ -5119,7 +5322,12 @@
             <p:ph idx="1"/>
           </p:nvPr>
         </p:nvSpPr>
-        <p:spPr/>
+        <p:spPr>
+          <a:xfrm>
+            <a:off x="1079291" y="2171700"/>
+            <a:ext cx="9601200" cy="3581400"/>
+          </a:xfrm>
+        </p:spPr>
         <p:txBody>
           <a:bodyPr>
             <a:normAutofit/>

</xml_diff>